<commit_message>
Modif classe composée powerpoint
</commit_message>
<xml_diff>
--- a/src/projet/projet3/Powerpoint_pacman.pptx
+++ b/src/projet/projet3/Powerpoint_pacman.pptx
@@ -7174,8 +7174,13 @@
           <a:p>
             <a:r>
               <a:rPr lang="fr-FR" dirty="0"/>
-              <a:t>La classe Button a été composée car cela permet de facilement avoir plusieurs boutons avec des tailles, des textes et des couleurs différentes</a:t>
-            </a:r>
+              <a:t>La classe Button a été composée car cela peut permettre de facilement réutiliser l’un des </a:t>
+            </a:r>
+            <a:r>
+              <a:rPr lang="fr-FR"/>
+              <a:t>composants indépendamment.</a:t>
+            </a:r>
+            <a:endParaRPr lang="fr-FR" dirty="0"/>
           </a:p>
         </p:txBody>
       </p:sp>
@@ -8921,7 +8926,7 @@
           <a:p>
             <a:r>
               <a:rPr lang="fr-FR" dirty="0"/>
-              <a:t>Nous avons trouvé un site qui donne des exemples de jeu 2D avec Python. (</a:t>
+              <a:t>Nous avons trouvé un site qui donne des exemples de jeux 2D avec Python. (</a:t>
             </a:r>
             <a:r>
               <a:rPr lang="fr-CH" dirty="0"/>
@@ -9051,7 +9056,7 @@
           <a:p>
             <a:r>
               <a:rPr lang="fr-FR" dirty="0"/>
-              <a:t>Nombre d’heures passé au projet : 40 heures</a:t>
+              <a:t>Nombre d’heures passées sur le projet : 40 heures</a:t>
             </a:r>
           </a:p>
           <a:p>

</xml_diff>

<commit_message>
Revert "Merge branch 'main' of https://github.com/Bugnon/oc-2021"
This reverts commit 88c35d602f279c8d6ad23a74aefec07fc352c556, reversing
changes made to d47992e84ca02d7074faabbff6537e193c01d906.
</commit_message>
<xml_diff>
--- a/src/projet/projet3/Powerpoint_pacman.pptx
+++ b/src/projet/projet3/Powerpoint_pacman.pptx
@@ -4,12 +4,6 @@
   <p:sldMasterIdLst>
     <p:sldMasterId id="2147483648" r:id="rId1"/>
   </p:sldMasterIdLst>
-  <p:notesMasterIdLst>
-    <p:notesMasterId r:id="rId22"/>
-  </p:notesMasterIdLst>
-  <p:handoutMasterIdLst>
-    <p:handoutMasterId r:id="rId23"/>
-  </p:handoutMasterIdLst>
   <p:sldIdLst>
     <p:sldId id="256" r:id="rId2"/>
     <p:sldId id="257" r:id="rId3"/>
@@ -135,552 +129,6 @@
     </p:ext>
   </p:extLst>
 </p:presentation>
-</file>
-
-<file path=ppt/handoutMasters/handoutMaster1.xml><?xml version="1.0" encoding="utf-8"?>
-<p:handoutMaster xmlns:a="http://schemas.openxmlformats.org/drawingml/2006/main" xmlns:r="http://schemas.openxmlformats.org/officeDocument/2006/relationships" xmlns:p="http://schemas.openxmlformats.org/presentationml/2006/main">
-  <p:cSld>
-    <p:bg>
-      <p:bgRef idx="1001">
-        <a:schemeClr val="bg1"/>
-      </p:bgRef>
-    </p:bg>
-    <p:spTree>
-      <p:nvGrpSpPr>
-        <p:cNvPr id="1" name=""/>
-        <p:cNvGrpSpPr/>
-        <p:nvPr/>
-      </p:nvGrpSpPr>
-      <p:grpSpPr>
-        <a:xfrm>
-          <a:off x="0" y="0"/>
-          <a:ext cx="0" cy="0"/>
-          <a:chOff x="0" y="0"/>
-          <a:chExt cx="0" cy="0"/>
-        </a:xfrm>
-      </p:grpSpPr>
-      <p:sp>
-        <p:nvSpPr>
-          <p:cNvPr id="2" name="Espace réservé de l'en-tête 1">
-            <a:extLst>
-              <a:ext uri="{FF2B5EF4-FFF2-40B4-BE49-F238E27FC236}">
-                <a16:creationId xmlns:a16="http://schemas.microsoft.com/office/drawing/2014/main" id="{2E64D80F-34BF-2240-AAEF-ABAF572B3A29}"/>
-              </a:ext>
-            </a:extLst>
-          </p:cNvPr>
-          <p:cNvSpPr>
-            <a:spLocks noGrp="1"/>
-          </p:cNvSpPr>
-          <p:nvPr>
-            <p:ph type="hdr" sz="quarter"/>
-          </p:nvPr>
-        </p:nvSpPr>
-        <p:spPr>
-          <a:xfrm>
-            <a:off x="0" y="0"/>
-            <a:ext cx="2971800" cy="458788"/>
-          </a:xfrm>
-          <a:prstGeom prst="rect">
-            <a:avLst/>
-          </a:prstGeom>
-        </p:spPr>
-        <p:txBody>
-          <a:bodyPr vert="horz" lIns="91440" tIns="45720" rIns="91440" bIns="45720" rtlCol="0"/>
-          <a:lstStyle>
-            <a:lvl1pPr algn="l">
-              <a:defRPr sz="1200"/>
-            </a:lvl1pPr>
-          </a:lstStyle>
-          <a:p>
-            <a:endParaRPr lang="fr-FR"/>
-          </a:p>
-        </p:txBody>
-      </p:sp>
-      <p:sp>
-        <p:nvSpPr>
-          <p:cNvPr id="3" name="Espace réservé de la date 2">
-            <a:extLst>
-              <a:ext uri="{FF2B5EF4-FFF2-40B4-BE49-F238E27FC236}">
-                <a16:creationId xmlns:a16="http://schemas.microsoft.com/office/drawing/2014/main" id="{F6EF840F-D185-A14B-A55A-0D92C0419179}"/>
-              </a:ext>
-            </a:extLst>
-          </p:cNvPr>
-          <p:cNvSpPr>
-            <a:spLocks noGrp="1"/>
-          </p:cNvSpPr>
-          <p:nvPr>
-            <p:ph type="dt" sz="quarter" idx="1"/>
-          </p:nvPr>
-        </p:nvSpPr>
-        <p:spPr>
-          <a:xfrm>
-            <a:off x="3884613" y="0"/>
-            <a:ext cx="2971800" cy="458788"/>
-          </a:xfrm>
-          <a:prstGeom prst="rect">
-            <a:avLst/>
-          </a:prstGeom>
-        </p:spPr>
-        <p:txBody>
-          <a:bodyPr vert="horz" lIns="91440" tIns="45720" rIns="91440" bIns="45720" rtlCol="0"/>
-          <a:lstStyle>
-            <a:lvl1pPr algn="r">
-              <a:defRPr sz="1200"/>
-            </a:lvl1pPr>
-          </a:lstStyle>
-          <a:p>
-            <a:fld id="{88E391C9-19C0-0C45-80C2-604602DDAFC3}" type="datetimeFigureOut">
-              <a:rPr lang="fr-FR" smtClean="0"/>
-              <a:t>16/06/2022</a:t>
-            </a:fld>
-            <a:endParaRPr lang="fr-FR"/>
-          </a:p>
-        </p:txBody>
-      </p:sp>
-      <p:sp>
-        <p:nvSpPr>
-          <p:cNvPr id="4" name="Espace réservé du pied de page 3">
-            <a:extLst>
-              <a:ext uri="{FF2B5EF4-FFF2-40B4-BE49-F238E27FC236}">
-                <a16:creationId xmlns:a16="http://schemas.microsoft.com/office/drawing/2014/main" id="{D079BBE8-8D46-ED43-9F39-0DBE871E7F63}"/>
-              </a:ext>
-            </a:extLst>
-          </p:cNvPr>
-          <p:cNvSpPr>
-            <a:spLocks noGrp="1"/>
-          </p:cNvSpPr>
-          <p:nvPr>
-            <p:ph type="ftr" sz="quarter" idx="2"/>
-          </p:nvPr>
-        </p:nvSpPr>
-        <p:spPr>
-          <a:xfrm>
-            <a:off x="0" y="8685213"/>
-            <a:ext cx="2971800" cy="458787"/>
-          </a:xfrm>
-          <a:prstGeom prst="rect">
-            <a:avLst/>
-          </a:prstGeom>
-        </p:spPr>
-        <p:txBody>
-          <a:bodyPr vert="horz" lIns="91440" tIns="45720" rIns="91440" bIns="45720" rtlCol="0" anchor="b"/>
-          <a:lstStyle>
-            <a:lvl1pPr algn="l">
-              <a:defRPr sz="1200"/>
-            </a:lvl1pPr>
-          </a:lstStyle>
-          <a:p>
-            <a:r>
-              <a:rPr lang="fr-FR"/>
-              <a:t>salut</a:t>
-            </a:r>
-          </a:p>
-        </p:txBody>
-      </p:sp>
-      <p:sp>
-        <p:nvSpPr>
-          <p:cNvPr id="5" name="Espace réservé du numéro de diapositive 4">
-            <a:extLst>
-              <a:ext uri="{FF2B5EF4-FFF2-40B4-BE49-F238E27FC236}">
-                <a16:creationId xmlns:a16="http://schemas.microsoft.com/office/drawing/2014/main" id="{C2BE4149-93FD-9F41-A95E-6F840DD40F4D}"/>
-              </a:ext>
-            </a:extLst>
-          </p:cNvPr>
-          <p:cNvSpPr>
-            <a:spLocks noGrp="1"/>
-          </p:cNvSpPr>
-          <p:nvPr>
-            <p:ph type="sldNum" sz="quarter" idx="3"/>
-          </p:nvPr>
-        </p:nvSpPr>
-        <p:spPr>
-          <a:xfrm>
-            <a:off x="3884613" y="8685213"/>
-            <a:ext cx="2971800" cy="458787"/>
-          </a:xfrm>
-          <a:prstGeom prst="rect">
-            <a:avLst/>
-          </a:prstGeom>
-        </p:spPr>
-        <p:txBody>
-          <a:bodyPr vert="horz" lIns="91440" tIns="45720" rIns="91440" bIns="45720" rtlCol="0" anchor="b"/>
-          <a:lstStyle>
-            <a:lvl1pPr algn="r">
-              <a:defRPr sz="1200"/>
-            </a:lvl1pPr>
-          </a:lstStyle>
-          <a:p>
-            <a:fld id="{79A8439F-6BFC-7C45-A843-835286AA4BAB}" type="slidenum">
-              <a:rPr lang="fr-FR" smtClean="0"/>
-              <a:t>‹N°›</a:t>
-            </a:fld>
-            <a:endParaRPr lang="fr-FR"/>
-          </a:p>
-        </p:txBody>
-      </p:sp>
-    </p:spTree>
-    <p:extLst>
-      <p:ext uri="{BB962C8B-B14F-4D97-AF65-F5344CB8AC3E}">
-        <p14:creationId xmlns:p14="http://schemas.microsoft.com/office/powerpoint/2010/main" val="3792312206"/>
-      </p:ext>
-    </p:extLst>
-  </p:cSld>
-  <p:clrMap bg1="lt1" tx1="dk1" bg2="lt2" tx2="dk2" accent1="accent1" accent2="accent2" accent3="accent3" accent4="accent4" accent5="accent5" accent6="accent6" hlink="hlink" folHlink="folHlink"/>
-  <p:hf hdr="0" dt="0"/>
-</p:handoutMaster>
-</file>
-
-<file path=ppt/notesMasters/notesMaster1.xml><?xml version="1.0" encoding="utf-8"?>
-<p:notesMaster xmlns:a="http://schemas.openxmlformats.org/drawingml/2006/main" xmlns:r="http://schemas.openxmlformats.org/officeDocument/2006/relationships" xmlns:p="http://schemas.openxmlformats.org/presentationml/2006/main">
-  <p:cSld>
-    <p:bg>
-      <p:bgRef idx="1001">
-        <a:schemeClr val="bg1"/>
-      </p:bgRef>
-    </p:bg>
-    <p:spTree>
-      <p:nvGrpSpPr>
-        <p:cNvPr id="1" name=""/>
-        <p:cNvGrpSpPr/>
-        <p:nvPr/>
-      </p:nvGrpSpPr>
-      <p:grpSpPr>
-        <a:xfrm>
-          <a:off x="0" y="0"/>
-          <a:ext cx="0" cy="0"/>
-          <a:chOff x="0" y="0"/>
-          <a:chExt cx="0" cy="0"/>
-        </a:xfrm>
-      </p:grpSpPr>
-      <p:sp>
-        <p:nvSpPr>
-          <p:cNvPr id="2" name="Espace réservé de l'en-tête 1"/>
-          <p:cNvSpPr>
-            <a:spLocks noGrp="1"/>
-          </p:cNvSpPr>
-          <p:nvPr>
-            <p:ph type="hdr" sz="quarter"/>
-          </p:nvPr>
-        </p:nvSpPr>
-        <p:spPr>
-          <a:xfrm>
-            <a:off x="0" y="0"/>
-            <a:ext cx="2971800" cy="458788"/>
-          </a:xfrm>
-          <a:prstGeom prst="rect">
-            <a:avLst/>
-          </a:prstGeom>
-        </p:spPr>
-        <p:txBody>
-          <a:bodyPr vert="horz" lIns="91440" tIns="45720" rIns="91440" bIns="45720" rtlCol="0"/>
-          <a:lstStyle>
-            <a:lvl1pPr algn="l">
-              <a:defRPr sz="1200"/>
-            </a:lvl1pPr>
-          </a:lstStyle>
-          <a:p>
-            <a:endParaRPr lang="fr-FR"/>
-          </a:p>
-        </p:txBody>
-      </p:sp>
-      <p:sp>
-        <p:nvSpPr>
-          <p:cNvPr id="3" name="Espace réservé de la date 2"/>
-          <p:cNvSpPr>
-            <a:spLocks noGrp="1"/>
-          </p:cNvSpPr>
-          <p:nvPr>
-            <p:ph type="dt" idx="1"/>
-          </p:nvPr>
-        </p:nvSpPr>
-        <p:spPr>
-          <a:xfrm>
-            <a:off x="3884613" y="0"/>
-            <a:ext cx="2971800" cy="458788"/>
-          </a:xfrm>
-          <a:prstGeom prst="rect">
-            <a:avLst/>
-          </a:prstGeom>
-        </p:spPr>
-        <p:txBody>
-          <a:bodyPr vert="horz" lIns="91440" tIns="45720" rIns="91440" bIns="45720" rtlCol="0"/>
-          <a:lstStyle>
-            <a:lvl1pPr algn="r">
-              <a:defRPr sz="1200"/>
-            </a:lvl1pPr>
-          </a:lstStyle>
-          <a:p>
-            <a:fld id="{A67B2A18-DA22-BD49-BBBA-10A65E13FE68}" type="datetimeFigureOut">
-              <a:rPr lang="fr-FR" smtClean="0"/>
-              <a:t>16/06/2022</a:t>
-            </a:fld>
-            <a:endParaRPr lang="fr-FR"/>
-          </a:p>
-        </p:txBody>
-      </p:sp>
-      <p:sp>
-        <p:nvSpPr>
-          <p:cNvPr id="4" name="Espace réservé de l'image des diapositives 3"/>
-          <p:cNvSpPr>
-            <a:spLocks noGrp="1" noRot="1" noChangeAspect="1"/>
-          </p:cNvSpPr>
-          <p:nvPr>
-            <p:ph type="sldImg" idx="2"/>
-          </p:nvPr>
-        </p:nvSpPr>
-        <p:spPr>
-          <a:xfrm>
-            <a:off x="685800" y="1143000"/>
-            <a:ext cx="5486400" cy="3086100"/>
-          </a:xfrm>
-          <a:prstGeom prst="rect">
-            <a:avLst/>
-          </a:prstGeom>
-          <a:noFill/>
-          <a:ln w="12700">
-            <a:solidFill>
-              <a:prstClr val="black"/>
-            </a:solidFill>
-          </a:ln>
-        </p:spPr>
-        <p:txBody>
-          <a:bodyPr vert="horz" lIns="91440" tIns="45720" rIns="91440" bIns="45720" rtlCol="0" anchor="ctr"/>
-          <a:lstStyle/>
-          <a:p>
-            <a:endParaRPr lang="fr-FR"/>
-          </a:p>
-        </p:txBody>
-      </p:sp>
-      <p:sp>
-        <p:nvSpPr>
-          <p:cNvPr id="5" name="Espace réservé des notes 4"/>
-          <p:cNvSpPr>
-            <a:spLocks noGrp="1"/>
-          </p:cNvSpPr>
-          <p:nvPr>
-            <p:ph type="body" sz="quarter" idx="3"/>
-          </p:nvPr>
-        </p:nvSpPr>
-        <p:spPr>
-          <a:xfrm>
-            <a:off x="685800" y="4400550"/>
-            <a:ext cx="5486400" cy="3600450"/>
-          </a:xfrm>
-          <a:prstGeom prst="rect">
-            <a:avLst/>
-          </a:prstGeom>
-        </p:spPr>
-        <p:txBody>
-          <a:bodyPr vert="horz" lIns="91440" tIns="45720" rIns="91440" bIns="45720" rtlCol="0"/>
-          <a:lstStyle/>
-          <a:p>
-            <a:pPr lvl="0"/>
-            <a:r>
-              <a:rPr lang="fr-FR"/>
-              <a:t>Cliquez pour modifier les styles du texte du masque</a:t>
-            </a:r>
-          </a:p>
-          <a:p>
-            <a:pPr lvl="1"/>
-            <a:r>
-              <a:rPr lang="fr-FR"/>
-              <a:t>Deuxième niveau</a:t>
-            </a:r>
-          </a:p>
-          <a:p>
-            <a:pPr lvl="2"/>
-            <a:r>
-              <a:rPr lang="fr-FR"/>
-              <a:t>Troisième niveau</a:t>
-            </a:r>
-          </a:p>
-          <a:p>
-            <a:pPr lvl="3"/>
-            <a:r>
-              <a:rPr lang="fr-FR"/>
-              <a:t>Quatrième niveau</a:t>
-            </a:r>
-          </a:p>
-          <a:p>
-            <a:pPr lvl="4"/>
-            <a:r>
-              <a:rPr lang="fr-FR"/>
-              <a:t>Cinquième niveau</a:t>
-            </a:r>
-          </a:p>
-        </p:txBody>
-      </p:sp>
-      <p:sp>
-        <p:nvSpPr>
-          <p:cNvPr id="6" name="Espace réservé du pied de page 5"/>
-          <p:cNvSpPr>
-            <a:spLocks noGrp="1"/>
-          </p:cNvSpPr>
-          <p:nvPr>
-            <p:ph type="ftr" sz="quarter" idx="4"/>
-          </p:nvPr>
-        </p:nvSpPr>
-        <p:spPr>
-          <a:xfrm>
-            <a:off x="0" y="8685213"/>
-            <a:ext cx="2971800" cy="458787"/>
-          </a:xfrm>
-          <a:prstGeom prst="rect">
-            <a:avLst/>
-          </a:prstGeom>
-        </p:spPr>
-        <p:txBody>
-          <a:bodyPr vert="horz" lIns="91440" tIns="45720" rIns="91440" bIns="45720" rtlCol="0" anchor="b"/>
-          <a:lstStyle>
-            <a:lvl1pPr algn="l">
-              <a:defRPr sz="1200"/>
-            </a:lvl1pPr>
-          </a:lstStyle>
-          <a:p>
-            <a:r>
-              <a:rPr lang="fr-FR"/>
-              <a:t>salut</a:t>
-            </a:r>
-          </a:p>
-        </p:txBody>
-      </p:sp>
-      <p:sp>
-        <p:nvSpPr>
-          <p:cNvPr id="7" name="Espace réservé du numéro de diapositive 6"/>
-          <p:cNvSpPr>
-            <a:spLocks noGrp="1"/>
-          </p:cNvSpPr>
-          <p:nvPr>
-            <p:ph type="sldNum" sz="quarter" idx="5"/>
-          </p:nvPr>
-        </p:nvSpPr>
-        <p:spPr>
-          <a:xfrm>
-            <a:off x="3884613" y="8685213"/>
-            <a:ext cx="2971800" cy="458787"/>
-          </a:xfrm>
-          <a:prstGeom prst="rect">
-            <a:avLst/>
-          </a:prstGeom>
-        </p:spPr>
-        <p:txBody>
-          <a:bodyPr vert="horz" lIns="91440" tIns="45720" rIns="91440" bIns="45720" rtlCol="0" anchor="b"/>
-          <a:lstStyle>
-            <a:lvl1pPr algn="r">
-              <a:defRPr sz="1200"/>
-            </a:lvl1pPr>
-          </a:lstStyle>
-          <a:p>
-            <a:fld id="{79430592-3608-D343-B5B0-7C6BD02576B9}" type="slidenum">
-              <a:rPr lang="fr-FR" smtClean="0"/>
-              <a:t>‹N°›</a:t>
-            </a:fld>
-            <a:endParaRPr lang="fr-FR"/>
-          </a:p>
-        </p:txBody>
-      </p:sp>
-    </p:spTree>
-    <p:extLst>
-      <p:ext uri="{BB962C8B-B14F-4D97-AF65-F5344CB8AC3E}">
-        <p14:creationId xmlns:p14="http://schemas.microsoft.com/office/powerpoint/2010/main" val="1100136155"/>
-      </p:ext>
-    </p:extLst>
-  </p:cSld>
-  <p:clrMap bg1="lt1" tx1="dk1" bg2="lt2" tx2="dk2" accent1="accent1" accent2="accent2" accent3="accent3" accent4="accent4" accent5="accent5" accent6="accent6" hlink="hlink" folHlink="folHlink"/>
-  <p:hf hdr="0" dt="0"/>
-  <p:notesStyle>
-    <a:lvl1pPr marL="0" algn="l" defTabSz="914400" rtl="0" eaLnBrk="1" latinLnBrk="0" hangingPunct="1">
-      <a:defRPr sz="1200" kern="1200">
-        <a:solidFill>
-          <a:schemeClr val="tx1"/>
-        </a:solidFill>
-        <a:latin typeface="+mn-lt"/>
-        <a:ea typeface="+mn-ea"/>
-        <a:cs typeface="+mn-cs"/>
-      </a:defRPr>
-    </a:lvl1pPr>
-    <a:lvl2pPr marL="457200" algn="l" defTabSz="914400" rtl="0" eaLnBrk="1" latinLnBrk="0" hangingPunct="1">
-      <a:defRPr sz="1200" kern="1200">
-        <a:solidFill>
-          <a:schemeClr val="tx1"/>
-        </a:solidFill>
-        <a:latin typeface="+mn-lt"/>
-        <a:ea typeface="+mn-ea"/>
-        <a:cs typeface="+mn-cs"/>
-      </a:defRPr>
-    </a:lvl2pPr>
-    <a:lvl3pPr marL="914400" algn="l" defTabSz="914400" rtl="0" eaLnBrk="1" latinLnBrk="0" hangingPunct="1">
-      <a:defRPr sz="1200" kern="1200">
-        <a:solidFill>
-          <a:schemeClr val="tx1"/>
-        </a:solidFill>
-        <a:latin typeface="+mn-lt"/>
-        <a:ea typeface="+mn-ea"/>
-        <a:cs typeface="+mn-cs"/>
-      </a:defRPr>
-    </a:lvl3pPr>
-    <a:lvl4pPr marL="1371600" algn="l" defTabSz="914400" rtl="0" eaLnBrk="1" latinLnBrk="0" hangingPunct="1">
-      <a:defRPr sz="1200" kern="1200">
-        <a:solidFill>
-          <a:schemeClr val="tx1"/>
-        </a:solidFill>
-        <a:latin typeface="+mn-lt"/>
-        <a:ea typeface="+mn-ea"/>
-        <a:cs typeface="+mn-cs"/>
-      </a:defRPr>
-    </a:lvl4pPr>
-    <a:lvl5pPr marL="1828800" algn="l" defTabSz="914400" rtl="0" eaLnBrk="1" latinLnBrk="0" hangingPunct="1">
-      <a:defRPr sz="1200" kern="1200">
-        <a:solidFill>
-          <a:schemeClr val="tx1"/>
-        </a:solidFill>
-        <a:latin typeface="+mn-lt"/>
-        <a:ea typeface="+mn-ea"/>
-        <a:cs typeface="+mn-cs"/>
-      </a:defRPr>
-    </a:lvl5pPr>
-    <a:lvl6pPr marL="2286000" algn="l" defTabSz="914400" rtl="0" eaLnBrk="1" latinLnBrk="0" hangingPunct="1">
-      <a:defRPr sz="1200" kern="1200">
-        <a:solidFill>
-          <a:schemeClr val="tx1"/>
-        </a:solidFill>
-        <a:latin typeface="+mn-lt"/>
-        <a:ea typeface="+mn-ea"/>
-        <a:cs typeface="+mn-cs"/>
-      </a:defRPr>
-    </a:lvl6pPr>
-    <a:lvl7pPr marL="2743200" algn="l" defTabSz="914400" rtl="0" eaLnBrk="1" latinLnBrk="0" hangingPunct="1">
-      <a:defRPr sz="1200" kern="1200">
-        <a:solidFill>
-          <a:schemeClr val="tx1"/>
-        </a:solidFill>
-        <a:latin typeface="+mn-lt"/>
-        <a:ea typeface="+mn-ea"/>
-        <a:cs typeface="+mn-cs"/>
-      </a:defRPr>
-    </a:lvl7pPr>
-    <a:lvl8pPr marL="3200400" algn="l" defTabSz="914400" rtl="0" eaLnBrk="1" latinLnBrk="0" hangingPunct="1">
-      <a:defRPr sz="1200" kern="1200">
-        <a:solidFill>
-          <a:schemeClr val="tx1"/>
-        </a:solidFill>
-        <a:latin typeface="+mn-lt"/>
-        <a:ea typeface="+mn-ea"/>
-        <a:cs typeface="+mn-cs"/>
-      </a:defRPr>
-    </a:lvl8pPr>
-    <a:lvl9pPr marL="3657600" algn="l" defTabSz="914400" rtl="0" eaLnBrk="1" latinLnBrk="0" hangingPunct="1">
-      <a:defRPr sz="1200" kern="1200">
-        <a:solidFill>
-          <a:schemeClr val="tx1"/>
-        </a:solidFill>
-        <a:latin typeface="+mn-lt"/>
-        <a:ea typeface="+mn-ea"/>
-        <a:cs typeface="+mn-cs"/>
-      </a:defRPr>
-    </a:lvl9pPr>
-  </p:notesStyle>
-</p:notesMaster>
 </file>
 
 <file path=ppt/slideLayouts/slideLayout1.xml><?xml version="1.0" encoding="utf-8"?>
@@ -7174,13 +6622,8 @@
           <a:p>
             <a:r>
               <a:rPr lang="fr-FR" dirty="0"/>
-              <a:t>La classe Button a été composée car cela peut permettre de facilement réutiliser l’un des </a:t>
-            </a:r>
-            <a:r>
-              <a:rPr lang="fr-FR"/>
-              <a:t>composants indépendamment.</a:t>
-            </a:r>
-            <a:endParaRPr lang="fr-FR" dirty="0"/>
+              <a:t>La classe Button a été composée car cela permet de facilement avoir plusieurs boutons avec des tailles, des textes et des couleurs différentes</a:t>
+            </a:r>
           </a:p>
         </p:txBody>
       </p:sp>
@@ -7484,36 +6927,6 @@
           </a:p>
         </p:txBody>
       </p:sp>
-      <p:pic>
-        <p:nvPicPr>
-          <p:cNvPr id="5" name="Image 4" descr="Une image contenant texte&#10;&#10;Description générée automatiquement">
-            <a:extLst>
-              <a:ext uri="{FF2B5EF4-FFF2-40B4-BE49-F238E27FC236}">
-                <a16:creationId xmlns:a16="http://schemas.microsoft.com/office/drawing/2014/main" id="{C866189F-3C79-084B-9539-B7157689DEA8}"/>
-              </a:ext>
-            </a:extLst>
-          </p:cNvPr>
-          <p:cNvPicPr>
-            <a:picLocks noChangeAspect="1"/>
-          </p:cNvPicPr>
-          <p:nvPr/>
-        </p:nvPicPr>
-        <p:blipFill>
-          <a:blip r:embed="rId2"/>
-          <a:stretch>
-            <a:fillRect/>
-          </a:stretch>
-        </p:blipFill>
-        <p:spPr>
-          <a:xfrm>
-            <a:off x="2599348" y="3522204"/>
-            <a:ext cx="6651720" cy="1680811"/>
-          </a:xfrm>
-          <a:prstGeom prst="rect">
-            <a:avLst/>
-          </a:prstGeom>
-        </p:spPr>
-      </p:pic>
     </p:spTree>
     <p:extLst>
       <p:ext uri="{BB962C8B-B14F-4D97-AF65-F5344CB8AC3E}">
@@ -7647,36 +7060,6 @@
           </a:p>
         </p:txBody>
       </p:sp>
-      <p:pic>
-        <p:nvPicPr>
-          <p:cNvPr id="5" name="Image 4" descr="Une image contenant texte&#10;&#10;Description générée automatiquement">
-            <a:extLst>
-              <a:ext uri="{FF2B5EF4-FFF2-40B4-BE49-F238E27FC236}">
-                <a16:creationId xmlns:a16="http://schemas.microsoft.com/office/drawing/2014/main" id="{6F487B3E-0CB9-324D-B837-26114AC6DE29}"/>
-              </a:ext>
-            </a:extLst>
-          </p:cNvPr>
-          <p:cNvPicPr>
-            <a:picLocks noChangeAspect="1"/>
-          </p:cNvPicPr>
-          <p:nvPr/>
-        </p:nvPicPr>
-        <p:blipFill>
-          <a:blip r:embed="rId2"/>
-          <a:stretch>
-            <a:fillRect/>
-          </a:stretch>
-        </p:blipFill>
-        <p:spPr>
-          <a:xfrm>
-            <a:off x="3003550" y="4322482"/>
-            <a:ext cx="6184900" cy="2082800"/>
-          </a:xfrm>
-          <a:prstGeom prst="rect">
-            <a:avLst/>
-          </a:prstGeom>
-        </p:spPr>
-      </p:pic>
     </p:spTree>
     <p:extLst>
       <p:ext uri="{BB962C8B-B14F-4D97-AF65-F5344CB8AC3E}">
@@ -7828,36 +7211,6 @@
           </a:p>
         </p:txBody>
       </p:sp>
-      <p:pic>
-        <p:nvPicPr>
-          <p:cNvPr id="5" name="Image 4" descr="Une image contenant texte, écran, capture d’écran&#10;&#10;Description générée automatiquement">
-            <a:extLst>
-              <a:ext uri="{FF2B5EF4-FFF2-40B4-BE49-F238E27FC236}">
-                <a16:creationId xmlns:a16="http://schemas.microsoft.com/office/drawing/2014/main" id="{1386BA68-54EC-444D-9648-11E4F41C288B}"/>
-              </a:ext>
-            </a:extLst>
-          </p:cNvPr>
-          <p:cNvPicPr>
-            <a:picLocks noChangeAspect="1"/>
-          </p:cNvPicPr>
-          <p:nvPr/>
-        </p:nvPicPr>
-        <p:blipFill>
-          <a:blip r:embed="rId2"/>
-          <a:stretch>
-            <a:fillRect/>
-          </a:stretch>
-        </p:blipFill>
-        <p:spPr>
-          <a:xfrm>
-            <a:off x="3301835" y="4325893"/>
-            <a:ext cx="5588330" cy="2532107"/>
-          </a:xfrm>
-          <a:prstGeom prst="rect">
-            <a:avLst/>
-          </a:prstGeom>
-        </p:spPr>
-      </p:pic>
     </p:spTree>
     <p:extLst>
       <p:ext uri="{BB962C8B-B14F-4D97-AF65-F5344CB8AC3E}">
@@ -8099,30 +7452,6 @@
 <file path=ppt/slides/slide17.xml><?xml version="1.0" encoding="utf-8"?>
 <p:sld xmlns:a="http://schemas.openxmlformats.org/drawingml/2006/main" xmlns:r="http://schemas.openxmlformats.org/officeDocument/2006/relationships" xmlns:p="http://schemas.openxmlformats.org/presentationml/2006/main">
   <p:cSld>
-    <p:bg>
-      <p:bgPr>
-        <a:blipFill rotWithShape="1">
-          <a:blip r:embed="rId2">
-            <a:duotone>
-              <a:schemeClr val="bg2">
-                <a:shade val="69000"/>
-                <a:hueMod val="108000"/>
-                <a:satMod val="164000"/>
-                <a:lumMod val="74000"/>
-              </a:schemeClr>
-              <a:schemeClr val="bg2">
-                <a:tint val="96000"/>
-                <a:hueMod val="88000"/>
-                <a:satMod val="140000"/>
-                <a:lumMod val="132000"/>
-              </a:schemeClr>
-            </a:duotone>
-          </a:blip>
-          <a:stretch/>
-        </a:blipFill>
-        <a:effectLst/>
-      </p:bgPr>
-    </p:bg>
     <p:spTree>
       <p:nvGrpSpPr>
         <p:cNvPr id="1" name=""/>
@@ -8153,16 +7482,9 @@
             <p:ph type="title"/>
           </p:nvPr>
         </p:nvSpPr>
-        <p:spPr>
-          <a:xfrm>
-            <a:off x="646111" y="609601"/>
-            <a:ext cx="4793473" cy="1675975"/>
-          </a:xfrm>
-        </p:spPr>
-        <p:txBody>
-          <a:bodyPr>
-            <a:normAutofit/>
-          </a:bodyPr>
+        <p:spPr/>
+        <p:txBody>
+          <a:bodyPr/>
           <a:lstStyle/>
           <a:p>
             <a:r>
@@ -8171,95 +7493,6 @@
             </a:r>
           </a:p>
         </p:txBody>
-      </p:sp>
-      <p:pic>
-        <p:nvPicPr>
-          <p:cNvPr id="5" name="Image 4" descr="Une image contenant texte, écran, capture d’écran&#10;&#10;Description générée automatiquement">
-            <a:extLst>
-              <a:ext uri="{FF2B5EF4-FFF2-40B4-BE49-F238E27FC236}">
-                <a16:creationId xmlns:a16="http://schemas.microsoft.com/office/drawing/2014/main" id="{0A80335E-2D49-264E-B0B5-4A712C2C0734}"/>
-              </a:ext>
-            </a:extLst>
-          </p:cNvPr>
-          <p:cNvPicPr>
-            <a:picLocks noChangeAspect="1"/>
-          </p:cNvPicPr>
-          <p:nvPr/>
-        </p:nvPicPr>
-        <p:blipFill rotWithShape="1">
-          <a:blip r:embed="rId3"/>
-          <a:srcRect t="959" r="2" b="2"/>
-          <a:stretch/>
-        </p:blipFill>
-        <p:spPr>
-          <a:xfrm>
-            <a:off x="6094412" y="609137"/>
-            <a:ext cx="5449888" cy="2766290"/>
-          </a:xfrm>
-          <a:prstGeom prst="rect">
-            <a:avLst/>
-          </a:prstGeom>
-          <a:effectLst>
-            <a:outerShdw blurRad="50800" dist="38100" dir="5400000" algn="t" rotWithShape="0">
-              <a:prstClr val="black">
-                <a:alpha val="43000"/>
-              </a:prstClr>
-            </a:outerShdw>
-          </a:effectLst>
-        </p:spPr>
-      </p:pic>
-      <p:sp>
-        <p:nvSpPr>
-          <p:cNvPr id="12" name="Rectangle 11">
-            <a:extLst>
-              <a:ext uri="{FF2B5EF4-FFF2-40B4-BE49-F238E27FC236}">
-                <a16:creationId xmlns:a16="http://schemas.microsoft.com/office/drawing/2014/main" id="{AC546BE4-C7A3-4A47-9FA5-0866D5E656B4}"/>
-              </a:ext>
-              <a:ext uri="{C183D7F6-B498-43B3-948B-1728B52AA6E4}">
-                <adec:decorative xmlns:adec="http://schemas.microsoft.com/office/drawing/2017/decorative" val="1"/>
-              </a:ext>
-            </a:extLst>
-          </p:cNvPr>
-          <p:cNvSpPr>
-            <a:spLocks noGrp="1" noRot="1" noChangeAspect="1" noMove="1" noResize="1" noEditPoints="1" noAdjustHandles="1" noChangeArrowheads="1" noChangeShapeType="1" noTextEdit="1"/>
-          </p:cNvSpPr>
-          <p:nvPr>
-            <p:extLst>
-              <p:ext uri="{386F3935-93C4-4BCD-93E2-E3B085C9AB24}">
-                <p16:designElem xmlns:p16="http://schemas.microsoft.com/office/powerpoint/2015/main" val="1"/>
-              </p:ext>
-            </p:extLst>
-          </p:nvPr>
-        </p:nvSpPr>
-        <p:spPr>
-          <a:xfrm>
-            <a:off x="10437812" y="0"/>
-            <a:ext cx="685800" cy="1143000"/>
-          </a:xfrm>
-          <a:prstGeom prst="rect">
-            <a:avLst/>
-          </a:prstGeom>
-          <a:solidFill>
-            <a:schemeClr val="accent1"/>
-          </a:solidFill>
-          <a:ln>
-            <a:noFill/>
-          </a:ln>
-        </p:spPr>
-        <p:style>
-          <a:lnRef idx="1">
-            <a:schemeClr val="accent1"/>
-          </a:lnRef>
-          <a:fillRef idx="3">
-            <a:schemeClr val="accent1"/>
-          </a:fillRef>
-          <a:effectRef idx="2">
-            <a:schemeClr val="accent1"/>
-          </a:effectRef>
-          <a:fontRef idx="minor">
-            <a:schemeClr val="lt1"/>
-          </a:fontRef>
-        </p:style>
       </p:sp>
       <p:sp>
         <p:nvSpPr>
@@ -8279,8 +7512,8 @@
         </p:nvSpPr>
         <p:spPr>
           <a:xfrm>
-            <a:off x="642175" y="2484544"/>
-            <a:ext cx="4799145" cy="3763855"/>
+            <a:off x="646111" y="1654985"/>
+            <a:ext cx="8946541" cy="4441015"/>
           </a:xfrm>
         </p:spPr>
         <p:txBody>
@@ -8291,69 +7524,35 @@
           <a:p>
             <a:r>
               <a:rPr lang="fr-FR" dirty="0"/>
-              <a:t>Le première image consiste à la création des deux labyrinthes</a:t>
-            </a:r>
-          </a:p>
-          <a:p>
-            <a:r>
-              <a:rPr lang="fr-FR" dirty="0"/>
-              <a:t>La deuxième permet de dessiner le score, </a:t>
-            </a:r>
-            <a:r>
-              <a:rPr lang="fr-FR" dirty="0" err="1"/>
-              <a:t>pacman</a:t>
-            </a:r>
-            <a:r>
-              <a:rPr lang="fr-FR" dirty="0"/>
-              <a:t>, le bouton </a:t>
-            </a:r>
-            <a:r>
-              <a:rPr lang="fr-FR" dirty="0" err="1"/>
-              <a:t>quit</a:t>
-            </a:r>
-            <a:r>
-              <a:rPr lang="fr-FR" dirty="0"/>
-              <a:t> et les fantômes. </a:t>
-            </a:r>
-          </a:p>
-        </p:txBody>
-      </p:sp>
-      <p:pic>
-        <p:nvPicPr>
-          <p:cNvPr id="7" name="Image 6" descr="Une image contenant texte&#10;&#10;Description générée automatiquement">
-            <a:extLst>
-              <a:ext uri="{FF2B5EF4-FFF2-40B4-BE49-F238E27FC236}">
-                <a16:creationId xmlns:a16="http://schemas.microsoft.com/office/drawing/2014/main" id="{30FC8738-ED4A-704F-B06F-CDD8FF0869D0}"/>
-              </a:ext>
-            </a:extLst>
-          </p:cNvPr>
-          <p:cNvPicPr>
-            <a:picLocks noChangeAspect="1"/>
-          </p:cNvPicPr>
-          <p:nvPr/>
-        </p:nvPicPr>
-        <p:blipFill rotWithShape="1">
-          <a:blip r:embed="rId4"/>
-          <a:srcRect r="23658"/>
-          <a:stretch/>
-        </p:blipFill>
-        <p:spPr>
-          <a:xfrm>
-            <a:off x="6094412" y="3482108"/>
-            <a:ext cx="5449888" cy="2766290"/>
-          </a:xfrm>
-          <a:prstGeom prst="rect">
-            <a:avLst/>
-          </a:prstGeom>
-          <a:effectLst>
-            <a:outerShdw blurRad="50800" dist="38100" dir="5400000" algn="t" rotWithShape="0">
-              <a:prstClr val="black">
-                <a:alpha val="43000"/>
-              </a:prstClr>
-            </a:outerShdw>
-          </a:effectLst>
-        </p:spPr>
-      </p:pic>
+              <a:t>Montrez comment sont dessinés vos éléments graphiques</a:t>
+            </a:r>
+          </a:p>
+          <a:p>
+            <a:r>
+              <a:rPr lang="fr-FR" dirty="0"/>
+              <a:t>Arrière-fond</a:t>
+            </a:r>
+          </a:p>
+          <a:p>
+            <a:r>
+              <a:rPr lang="fr-FR" dirty="0"/>
+              <a:t>Player</a:t>
+            </a:r>
+          </a:p>
+          <a:p>
+            <a:r>
+              <a:rPr lang="fr-FR" dirty="0"/>
+              <a:t>Texte</a:t>
+            </a:r>
+          </a:p>
+          <a:p>
+            <a:r>
+              <a:rPr lang="fr-FR" dirty="0"/>
+              <a:t>Autre éléments</a:t>
+            </a:r>
+          </a:p>
+        </p:txBody>
+      </p:sp>
     </p:spTree>
     <p:extLst>
       <p:ext uri="{BB962C8B-B14F-4D97-AF65-F5344CB8AC3E}">
@@ -8549,114 +7748,26 @@
         </p:spPr>
         <p:txBody>
           <a:bodyPr>
-            <a:normAutofit lnSpcReduction="10000"/>
+            <a:normAutofit/>
           </a:bodyPr>
           <a:lstStyle/>
           <a:p>
             <a:r>
               <a:rPr lang="fr-FR" dirty="0"/>
-              <a:t>Les forces de notre projet sont:</a:t>
-            </a:r>
-          </a:p>
-          <a:p>
-            <a:pPr lvl="1">
-              <a:buFont typeface="Arial" panose="020B0604020202020204" pitchFamily="34" charset="0"/>
-              <a:buChar char="•"/>
-            </a:pPr>
-            <a:r>
-              <a:rPr lang="fr-FR" dirty="0"/>
-              <a:t>Les deux niveaux de jeu</a:t>
-            </a:r>
-          </a:p>
-          <a:p>
-            <a:pPr lvl="1">
-              <a:buFont typeface="Arial" panose="020B0604020202020204" pitchFamily="34" charset="0"/>
-              <a:buChar char="•"/>
-            </a:pPr>
-            <a:r>
-              <a:rPr lang="fr-FR" dirty="0"/>
-              <a:t>L’intelligence des fantômes</a:t>
-            </a:r>
-          </a:p>
-          <a:p>
-            <a:pPr lvl="1">
-              <a:buFont typeface="Arial" panose="020B0604020202020204" pitchFamily="34" charset="0"/>
-              <a:buChar char="•"/>
-            </a:pPr>
-            <a:r>
-              <a:rPr lang="fr-FR" dirty="0"/>
-              <a:t>La simplicité</a:t>
-            </a:r>
-          </a:p>
-          <a:p>
-            <a:r>
-              <a:rPr lang="fr-FR" dirty="0"/>
-              <a:t>Les faiblesses de notre projet:</a:t>
-            </a:r>
-          </a:p>
-          <a:p>
-            <a:pPr lvl="1">
-              <a:buFont typeface="Arial" panose="020B0604020202020204" pitchFamily="34" charset="0"/>
-              <a:buChar char="•"/>
-            </a:pPr>
-            <a:r>
-              <a:rPr lang="fr-FR" dirty="0"/>
-              <a:t>Répétition des niveaux</a:t>
-            </a:r>
-          </a:p>
-          <a:p>
-            <a:pPr lvl="1">
-              <a:buFont typeface="Arial" panose="020B0604020202020204" pitchFamily="34" charset="0"/>
-              <a:buChar char="•"/>
-            </a:pPr>
-            <a:r>
-              <a:rPr lang="fr-FR" dirty="0"/>
-              <a:t>Pas d’historique des scores</a:t>
-            </a:r>
-          </a:p>
-          <a:p>
-            <a:pPr lvl="1">
-              <a:buFont typeface="Arial" panose="020B0604020202020204" pitchFamily="34" charset="0"/>
-              <a:buChar char="•"/>
-            </a:pPr>
-            <a:r>
-              <a:rPr lang="fr-FR" dirty="0"/>
-              <a:t>Pas de son</a:t>
-            </a:r>
-          </a:p>
-          <a:p>
-            <a:r>
-              <a:rPr lang="fr-FR" dirty="0"/>
-              <a:t>Ce que nous avons appris:</a:t>
-            </a:r>
-          </a:p>
-          <a:p>
-            <a:pPr lvl="1">
-              <a:buFont typeface="Arial" panose="020B0604020202020204" pitchFamily="34" charset="0"/>
-              <a:buChar char="•"/>
-            </a:pPr>
-            <a:r>
-              <a:rPr lang="fr-FR" dirty="0"/>
-              <a:t>Les liens entre les classes</a:t>
-            </a:r>
-          </a:p>
-          <a:p>
-            <a:pPr lvl="1">
-              <a:buFont typeface="Arial" panose="020B0604020202020204" pitchFamily="34" charset="0"/>
-              <a:buChar char="•"/>
-            </a:pPr>
-            <a:r>
-              <a:rPr lang="fr-FR" dirty="0"/>
-              <a:t>Pouvoir partager notre travail sur </a:t>
-            </a:r>
-            <a:r>
-              <a:rPr lang="fr-FR" dirty="0" err="1"/>
-              <a:t>github</a:t>
-            </a:r>
-            <a:endParaRPr lang="fr-FR" dirty="0"/>
-          </a:p>
-          <a:p>
-            <a:endParaRPr lang="fr-FR" dirty="0"/>
+              <a:t>Les forces de votre projet</a:t>
+            </a:r>
+          </a:p>
+          <a:p>
+            <a:r>
+              <a:rPr lang="fr-FR" dirty="0"/>
+              <a:t>Les faiblesses de votre projet</a:t>
+            </a:r>
+          </a:p>
+          <a:p>
+            <a:r>
+              <a:rPr lang="fr-FR" dirty="0"/>
+              <a:t>Ce que vous avez appris</a:t>
+            </a:r>
           </a:p>
         </p:txBody>
       </p:sp>
@@ -8754,7 +7865,7 @@
           <a:p>
             <a:r>
               <a:rPr lang="fr-FR" dirty="0"/>
-              <a:t>Il existe deux niveaux, on incarne un rond jaune et il y a des ennemis qui sont des ronds rouges.</a:t>
+              <a:t>Il existe deux labyrinthes, on incarne un rond jaune et il y a des ennemis qui sont des ronds rouges.</a:t>
             </a:r>
           </a:p>
           <a:p>
@@ -8768,15 +7879,7 @@
             </a:r>
             <a:r>
               <a:rPr lang="fr-FR" dirty="0"/>
-              <a:t> . Il y a aussi un bouton pour quitter le jeu si l’on souhaite et aussi un bouton </a:t>
-            </a:r>
-            <a:r>
-              <a:rPr lang="fr-FR" dirty="0" err="1"/>
-              <a:t>retry</a:t>
-            </a:r>
-            <a:r>
-              <a:rPr lang="fr-FR" dirty="0"/>
-              <a:t> pour recommencer.</a:t>
+              <a:t> et les touches 1 et 2 permettent de changer de plateforme. Il y a aussi une touche pour quitter le jeu si l’on souhaite.</a:t>
             </a:r>
           </a:p>
         </p:txBody>
@@ -8827,20 +7930,49 @@
             <p:ph type="title"/>
           </p:nvPr>
         </p:nvSpPr>
+        <p:spPr/>
+        <p:txBody>
+          <a:bodyPr/>
+          <a:lstStyle/>
+          <a:p>
+            <a:r>
+              <a:rPr lang="fr-FR" dirty="0"/>
+              <a:t>Démonstration</a:t>
+            </a:r>
+          </a:p>
+        </p:txBody>
+      </p:sp>
+      <p:sp>
+        <p:nvSpPr>
+          <p:cNvPr id="3" name="Espace réservé du contenu 2">
+            <a:extLst>
+              <a:ext uri="{FF2B5EF4-FFF2-40B4-BE49-F238E27FC236}">
+                <a16:creationId xmlns:a16="http://schemas.microsoft.com/office/drawing/2014/main" id="{E2D04534-56C5-6449-A0BC-5BA92625F5A2}"/>
+              </a:ext>
+            </a:extLst>
+          </p:cNvPr>
+          <p:cNvSpPr>
+            <a:spLocks noGrp="1"/>
+          </p:cNvSpPr>
+          <p:nvPr>
+            <p:ph idx="1"/>
+          </p:nvPr>
+        </p:nvSpPr>
         <p:spPr>
           <a:xfrm>
-            <a:off x="1393638" y="2728735"/>
-            <a:ext cx="9404723" cy="1400530"/>
+            <a:off x="646111" y="1654985"/>
+            <a:ext cx="8946541" cy="4441015"/>
           </a:xfrm>
         </p:spPr>
         <p:txBody>
-          <a:bodyPr/>
-          <a:lstStyle/>
-          <a:p>
-            <a:pPr algn="ctr"/>
-            <a:r>
-              <a:rPr lang="fr-FR" dirty="0"/>
-              <a:t>Démonstration</a:t>
+          <a:bodyPr>
+            <a:normAutofit/>
+          </a:bodyPr>
+          <a:lstStyle/>
+          <a:p>
+            <a:r>
+              <a:rPr lang="fr-FR" dirty="0"/>
+              <a:t>Faites une démonstration de votre jeu</a:t>
             </a:r>
           </a:p>
         </p:txBody>
@@ -8926,7 +8058,7 @@
           <a:p>
             <a:r>
               <a:rPr lang="fr-FR" dirty="0"/>
-              <a:t>Nous avons trouvé un site qui donne des exemples de jeux 2D avec Python. (</a:t>
+              <a:t>Nous avons trouvé un site qui donne des exemples de jeu 2d avec Python. (</a:t>
             </a:r>
             <a:r>
               <a:rPr lang="fr-CH" dirty="0"/>
@@ -9044,31 +8176,31 @@
           <a:p>
             <a:r>
               <a:rPr lang="fr-FR" dirty="0"/>
-              <a:t>Nombre de lignes de code : 396</a:t>
-            </a:r>
-          </a:p>
-          <a:p>
-            <a:r>
-              <a:rPr lang="fr-FR" dirty="0"/>
-              <a:t>Nombre de commit sur GitHub : 53</a:t>
-            </a:r>
-          </a:p>
-          <a:p>
-            <a:r>
-              <a:rPr lang="fr-FR" dirty="0"/>
-              <a:t>Nombre d’heures passées sur le projet : 40 heures</a:t>
-            </a:r>
-          </a:p>
-          <a:p>
-            <a:r>
-              <a:rPr lang="fr-FR" dirty="0"/>
-              <a:t>Répartition entre les 2 partenaires : 25 heures Alex et 15 heures Walid</a:t>
-            </a:r>
-          </a:p>
-          <a:p>
-            <a:r>
-              <a:rPr lang="fr-FR" dirty="0"/>
-              <a:t>Nombre de classes définies : 8</a:t>
+              <a:t>Nombre de lignes de code</a:t>
+            </a:r>
+          </a:p>
+          <a:p>
+            <a:r>
+              <a:rPr lang="fr-FR" dirty="0"/>
+              <a:t>Nombre de commit sur GitHub</a:t>
+            </a:r>
+          </a:p>
+          <a:p>
+            <a:r>
+              <a:rPr lang="fr-FR" dirty="0"/>
+              <a:t>Nombre d’heures passé au projet : 15 heures</a:t>
+            </a:r>
+          </a:p>
+          <a:p>
+            <a:r>
+              <a:rPr lang="fr-FR" dirty="0"/>
+              <a:t>Répartition entre les 2 partenaires</a:t>
+            </a:r>
+          </a:p>
+          <a:p>
+            <a:r>
+              <a:rPr lang="fr-FR" dirty="0"/>
+              <a:t>Nombre de classes définis : 8</a:t>
             </a:r>
           </a:p>
           <a:p>
@@ -9157,7 +8289,7 @@
           <a:p>
             <a:r>
               <a:rPr lang="fr-FR" dirty="0"/>
-              <a:t>Nous avons travaillé ensemble avec une pseudo-répartition des tâches, chacun apporte son idée et sa créativité et nous décidons ensemble ce qu’il en sera dans notre jeu.</a:t>
+              <a:t>Nous avons travaillé ensemble avec une pseudo-répartition des tâches, chacun apporte de son idée et créativité et décidons ensemble de ce qu’il en sera dans notre jeu.</a:t>
             </a:r>
           </a:p>
           <a:p>
@@ -9171,7 +8303,7 @@
             </a:r>
             <a:r>
               <a:rPr lang="fr-FR" dirty="0"/>
-              <a:t>, il fallait s’assurer que nous ne travaillions pas en même temps afin de ne pas créer de problèmes.</a:t>
+              <a:t>, il fallait s’assurer que nous ne travaillions pas en même temps afin de ne pas créer de problèmes. (push régulièrement)</a:t>
             </a:r>
           </a:p>
           <a:p>
@@ -9245,35 +8377,31 @@
           </a:p>
         </p:txBody>
       </p:sp>
-      <p:pic>
-        <p:nvPicPr>
-          <p:cNvPr id="5" name="Espace réservé du contenu 4" descr="Une image contenant texte, capture d’écran, moniteur, argent&#10;&#10;Description générée automatiquement">
+      <p:sp>
+        <p:nvSpPr>
+          <p:cNvPr id="3" name="Espace réservé du contenu 2">
             <a:extLst>
               <a:ext uri="{FF2B5EF4-FFF2-40B4-BE49-F238E27FC236}">
-                <a16:creationId xmlns:a16="http://schemas.microsoft.com/office/drawing/2014/main" id="{97D50098-18E7-564F-B3EA-7ED0046FF258}"/>
+                <a16:creationId xmlns:a16="http://schemas.microsoft.com/office/drawing/2014/main" id="{FA8F1B9B-C04E-074F-A417-9538DCD584C1}"/>
               </a:ext>
             </a:extLst>
           </p:cNvPr>
-          <p:cNvPicPr>
-            <a:picLocks noGrp="1" noChangeAspect="1"/>
-          </p:cNvPicPr>
+          <p:cNvSpPr>
+            <a:spLocks noGrp="1"/>
+          </p:cNvSpPr>
           <p:nvPr>
             <p:ph idx="1"/>
           </p:nvPr>
-        </p:nvPicPr>
-        <p:blipFill>
-          <a:blip r:embed="rId2"/>
-          <a:stretch>
-            <a:fillRect/>
-          </a:stretch>
-        </p:blipFill>
-        <p:spPr>
-          <a:xfrm>
-            <a:off x="2784088" y="1331119"/>
-            <a:ext cx="6480121" cy="4195762"/>
-          </a:xfrm>
-        </p:spPr>
-      </p:pic>
+        </p:nvSpPr>
+        <p:spPr/>
+        <p:txBody>
+          <a:bodyPr/>
+          <a:lstStyle/>
+          <a:p>
+            <a:endParaRPr lang="fr-FR"/>
+          </a:p>
+        </p:txBody>
+      </p:sp>
     </p:spTree>
     <p:extLst>
       <p:ext uri="{BB962C8B-B14F-4D97-AF65-F5344CB8AC3E}">
@@ -9304,6 +8432,36 @@
           <a:chExt cx="0" cy="0"/>
         </a:xfrm>
       </p:grpSpPr>
+      <p:pic>
+        <p:nvPicPr>
+          <p:cNvPr id="9" name="Image 8">
+            <a:extLst>
+              <a:ext uri="{FF2B5EF4-FFF2-40B4-BE49-F238E27FC236}">
+                <a16:creationId xmlns:a16="http://schemas.microsoft.com/office/drawing/2014/main" id="{93DC4A5F-1686-9089-1BFE-32128F6465E3}"/>
+              </a:ext>
+            </a:extLst>
+          </p:cNvPr>
+          <p:cNvPicPr>
+            <a:picLocks noChangeAspect="1"/>
+          </p:cNvPicPr>
+          <p:nvPr/>
+        </p:nvPicPr>
+        <p:blipFill>
+          <a:blip r:embed="rId2"/>
+          <a:stretch>
+            <a:fillRect/>
+          </a:stretch>
+        </p:blipFill>
+        <p:spPr>
+          <a:xfrm>
+            <a:off x="0" y="1"/>
+            <a:ext cx="12192000" cy="6805062"/>
+          </a:xfrm>
+          <a:prstGeom prst="rect">
+            <a:avLst/>
+          </a:prstGeom>
+        </p:spPr>
+      </p:pic>
       <p:sp>
         <p:nvSpPr>
           <p:cNvPr id="2" name="Titre 1">
@@ -9457,35 +8615,6 @@
           </a:p>
         </p:txBody>
       </p:sp>
-      <p:pic>
-        <p:nvPicPr>
-          <p:cNvPr id="5" name="Image 4">
-            <a:extLst>
-              <a:ext uri="{FF2B5EF4-FFF2-40B4-BE49-F238E27FC236}">
-                <a16:creationId xmlns:a16="http://schemas.microsoft.com/office/drawing/2014/main" id="{E874617F-1253-9C0F-4DFB-6008A48AB7EA}"/>
-              </a:ext>
-            </a:extLst>
-          </p:cNvPr>
-          <p:cNvPicPr>
-            <a:picLocks noChangeAspect="1"/>
-          </p:cNvPicPr>
-          <p:nvPr/>
-        </p:nvPicPr>
-        <p:blipFill rotWithShape="1">
-          <a:blip r:embed="rId2"/>
-          <a:srcRect l="11727"/>
-          <a:stretch/>
-        </p:blipFill>
-        <p:spPr>
-          <a:xfrm>
-            <a:off x="4351734" y="1852743"/>
-            <a:ext cx="3934618" cy="2769526"/>
-          </a:xfrm>
-          <a:prstGeom prst="rect">
-            <a:avLst/>
-          </a:prstGeom>
-        </p:spPr>
-      </p:pic>
     </p:spTree>
     <p:extLst>
       <p:ext uri="{BB962C8B-B14F-4D97-AF65-F5344CB8AC3E}">
@@ -10014,16 +9143,12 @@
               <a:buChar char="•"/>
             </a:pPr>
             <a:r>
-              <a:rPr lang="fr-FR" dirty="0"/>
-              <a:t>« </a:t>
-            </a:r>
-            <a:r>
               <a:rPr lang="fr-FR" dirty="0" err="1"/>
               <a:t>game</a:t>
             </a:r>
             <a:r>
               <a:rPr lang="fr-FR" dirty="0"/>
-              <a:t> » lui permet de communiquer avec la classe Game qui contient les informations sur son environnement</a:t>
+              <a:t> lui permet de communiquer avec la classe Game qui contient les informations sur son environnement</a:t>
             </a:r>
           </a:p>
           <a:p>
@@ -10033,7 +9158,7 @@
             </a:pPr>
             <a:r>
               <a:rPr lang="fr-FR" dirty="0"/>
-              <a:t>« pos » qui indique sa position actuelle</a:t>
+              <a:t>pos qui indique sa position actuelle</a:t>
             </a:r>
           </a:p>
           <a:p>
@@ -10042,16 +9167,12 @@
               <a:buChar char="•"/>
             </a:pPr>
             <a:r>
-              <a:rPr lang="fr-FR" dirty="0"/>
-              <a:t>« </a:t>
-            </a:r>
-            <a:r>
               <a:rPr lang="fr-FR" dirty="0" err="1"/>
               <a:t>aim</a:t>
             </a:r>
             <a:r>
               <a:rPr lang="fr-FR" dirty="0"/>
-              <a:t> » qui est la direction dans laquelle il va</a:t>
+              <a:t> qui est la direction dans laquelle il va</a:t>
             </a:r>
           </a:p>
           <a:p>
@@ -10061,7 +9182,7 @@
             </a:pPr>
             <a:r>
               <a:rPr lang="fr-FR" dirty="0"/>
-              <a:t>« direction » qui sauvegarde la direction souhaitée par le joueur</a:t>
+              <a:t>direction qui sauvegarde la direction souhaitée par le joueur</a:t>
             </a:r>
           </a:p>
           <a:p>
@@ -10070,16 +9191,12 @@
               <a:buChar char="•"/>
             </a:pPr>
             <a:r>
-              <a:rPr lang="fr-FR" dirty="0"/>
-              <a:t>« </a:t>
-            </a:r>
-            <a:r>
               <a:rPr lang="fr-FR" dirty="0" err="1"/>
               <a:t>isdead</a:t>
             </a:r>
             <a:r>
               <a:rPr lang="fr-FR" dirty="0"/>
-              <a:t> » qui permet de savoir si </a:t>
+              <a:t> qui permet de savoir si </a:t>
             </a:r>
             <a:r>
               <a:rPr lang="fr-FR" dirty="0" err="1"/>
@@ -10103,7 +9220,7 @@
             </a:pPr>
             <a:r>
               <a:rPr lang="fr-FR" dirty="0"/>
-              <a:t>« move » qui gère ses déplacements et ramasse les points</a:t>
+              <a:t>move qui gère ses déplacements et ramasse les points</a:t>
             </a:r>
           </a:p>
           <a:p>
@@ -10113,7 +9230,7 @@
             </a:pPr>
             <a:r>
               <a:rPr lang="fr-FR" dirty="0"/>
-              <a:t>« change » qui sauvegarde la direction souhaitée par le joueur</a:t>
+              <a:t>change qui sauvegarde la direction souhaitée par le joueur</a:t>
             </a:r>
           </a:p>
           <a:p>
@@ -10122,16 +9239,12 @@
               <a:buChar char="•"/>
             </a:pPr>
             <a:r>
-              <a:rPr lang="fr-FR" dirty="0"/>
-              <a:t>« </a:t>
-            </a:r>
-            <a:r>
               <a:rPr lang="fr-FR" dirty="0" err="1"/>
               <a:t>draw</a:t>
             </a:r>
             <a:r>
               <a:rPr lang="fr-FR" dirty="0"/>
-              <a:t> » qui dessine </a:t>
+              <a:t> qui dessine </a:t>
             </a:r>
             <a:r>
               <a:rPr lang="fr-FR" dirty="0" err="1"/>
@@ -10418,594 +9531,4 @@
     </a:ext>
   </a:extLst>
 </a:theme>
-</file>
-
-<file path=ppt/theme/theme2.xml><?xml version="1.0" encoding="utf-8"?>
-<a:theme xmlns:a="http://schemas.openxmlformats.org/drawingml/2006/main" name="Thème Office">
-  <a:themeElements>
-    <a:clrScheme name="Office">
-      <a:dk1>
-        <a:sysClr val="windowText" lastClr="000000"/>
-      </a:dk1>
-      <a:lt1>
-        <a:sysClr val="window" lastClr="FFFFFF"/>
-      </a:lt1>
-      <a:dk2>
-        <a:srgbClr val="44546A"/>
-      </a:dk2>
-      <a:lt2>
-        <a:srgbClr val="E7E6E6"/>
-      </a:lt2>
-      <a:accent1>
-        <a:srgbClr val="4472C4"/>
-      </a:accent1>
-      <a:accent2>
-        <a:srgbClr val="ED7D31"/>
-      </a:accent2>
-      <a:accent3>
-        <a:srgbClr val="A5A5A5"/>
-      </a:accent3>
-      <a:accent4>
-        <a:srgbClr val="FFC000"/>
-      </a:accent4>
-      <a:accent5>
-        <a:srgbClr val="5B9BD5"/>
-      </a:accent5>
-      <a:accent6>
-        <a:srgbClr val="70AD47"/>
-      </a:accent6>
-      <a:hlink>
-        <a:srgbClr val="0563C1"/>
-      </a:hlink>
-      <a:folHlink>
-        <a:srgbClr val="954F72"/>
-      </a:folHlink>
-    </a:clrScheme>
-    <a:fontScheme name="Office">
-      <a:majorFont>
-        <a:latin typeface="Calibri Light" panose="020F0302020204030204"/>
-        <a:ea typeface=""/>
-        <a:cs typeface=""/>
-        <a:font script="Jpan" typeface="游ゴシック Light"/>
-        <a:font script="Hang" typeface="맑은 고딕"/>
-        <a:font script="Hans" typeface="等线 Light"/>
-        <a:font script="Hant" typeface="新細明體"/>
-        <a:font script="Arab" typeface="Times New Roman"/>
-        <a:font script="Hebr" typeface="Times New Roman"/>
-        <a:font script="Thai" typeface="Angsana New"/>
-        <a:font script="Ethi" typeface="Nyala"/>
-        <a:font script="Beng" typeface="Vrinda"/>
-        <a:font script="Gujr" typeface="Shruti"/>
-        <a:font script="Khmr" typeface="MoolBoran"/>
-        <a:font script="Knda" typeface="Tunga"/>
-        <a:font script="Guru" typeface="Raavi"/>
-        <a:font script="Cans" typeface="Euphemia"/>
-        <a:font script="Cher" typeface="Plantagenet Cherokee"/>
-        <a:font script="Yiii" typeface="Microsoft Yi Baiti"/>
-        <a:font script="Tibt" typeface="Microsoft Himalaya"/>
-        <a:font script="Thaa" typeface="MV Boli"/>
-        <a:font script="Deva" typeface="Mangal"/>
-        <a:font script="Telu" typeface="Gautami"/>
-        <a:font script="Taml" typeface="Latha"/>
-        <a:font script="Syrc" typeface="Estrangelo Edessa"/>
-        <a:font script="Orya" typeface="Kalinga"/>
-        <a:font script="Mlym" typeface="Kartika"/>
-        <a:font script="Laoo" typeface="DokChampa"/>
-        <a:font script="Sinh" typeface="Iskoola Pota"/>
-        <a:font script="Mong" typeface="Mongolian Baiti"/>
-        <a:font script="Viet" typeface="Times New Roman"/>
-        <a:font script="Uigh" typeface="Microsoft Uighur"/>
-        <a:font script="Geor" typeface="Sylfaen"/>
-        <a:font script="Armn" typeface="Arial"/>
-        <a:font script="Bugi" typeface="Leelawadee UI"/>
-        <a:font script="Bopo" typeface="Microsoft JhengHei"/>
-        <a:font script="Java" typeface="Javanese Text"/>
-        <a:font script="Lisu" typeface="Segoe UI"/>
-        <a:font script="Mymr" typeface="Myanmar Text"/>
-        <a:font script="Nkoo" typeface="Ebrima"/>
-        <a:font script="Olck" typeface="Nirmala UI"/>
-        <a:font script="Osma" typeface="Ebrima"/>
-        <a:font script="Phag" typeface="Phagspa"/>
-        <a:font script="Syrn" typeface="Estrangelo Edessa"/>
-        <a:font script="Syrj" typeface="Estrangelo Edessa"/>
-        <a:font script="Syre" typeface="Estrangelo Edessa"/>
-        <a:font script="Sora" typeface="Nirmala UI"/>
-        <a:font script="Tale" typeface="Microsoft Tai Le"/>
-        <a:font script="Talu" typeface="Microsoft New Tai Lue"/>
-        <a:font script="Tfng" typeface="Ebrima"/>
-      </a:majorFont>
-      <a:minorFont>
-        <a:latin typeface="Calibri" panose="020F0502020204030204"/>
-        <a:ea typeface=""/>
-        <a:cs typeface=""/>
-        <a:font script="Jpan" typeface="游ゴシック"/>
-        <a:font script="Hang" typeface="맑은 고딕"/>
-        <a:font script="Hans" typeface="等线"/>
-        <a:font script="Hant" typeface="新細明體"/>
-        <a:font script="Arab" typeface="Arial"/>
-        <a:font script="Hebr" typeface="Arial"/>
-        <a:font script="Thai" typeface="Cordia New"/>
-        <a:font script="Ethi" typeface="Nyala"/>
-        <a:font script="Beng" typeface="Vrinda"/>
-        <a:font script="Gujr" typeface="Shruti"/>
-        <a:font script="Khmr" typeface="DaunPenh"/>
-        <a:font script="Knda" typeface="Tunga"/>
-        <a:font script="Guru" typeface="Raavi"/>
-        <a:font script="Cans" typeface="Euphemia"/>
-        <a:font script="Cher" typeface="Plantagenet Cherokee"/>
-        <a:font script="Yiii" typeface="Microsoft Yi Baiti"/>
-        <a:font script="Tibt" typeface="Microsoft Himalaya"/>
-        <a:font script="Thaa" typeface="MV Boli"/>
-        <a:font script="Deva" typeface="Mangal"/>
-        <a:font script="Telu" typeface="Gautami"/>
-        <a:font script="Taml" typeface="Latha"/>
-        <a:font script="Syrc" typeface="Estrangelo Edessa"/>
-        <a:font script="Orya" typeface="Kalinga"/>
-        <a:font script="Mlym" typeface="Kartika"/>
-        <a:font script="Laoo" typeface="DokChampa"/>
-        <a:font script="Sinh" typeface="Iskoola Pota"/>
-        <a:font script="Mong" typeface="Mongolian Baiti"/>
-        <a:font script="Viet" typeface="Arial"/>
-        <a:font script="Uigh" typeface="Microsoft Uighur"/>
-        <a:font script="Geor" typeface="Sylfaen"/>
-        <a:font script="Armn" typeface="Arial"/>
-        <a:font script="Bugi" typeface="Leelawadee UI"/>
-        <a:font script="Bopo" typeface="Microsoft JhengHei"/>
-        <a:font script="Java" typeface="Javanese Text"/>
-        <a:font script="Lisu" typeface="Segoe UI"/>
-        <a:font script="Mymr" typeface="Myanmar Text"/>
-        <a:font script="Nkoo" typeface="Ebrima"/>
-        <a:font script="Olck" typeface="Nirmala UI"/>
-        <a:font script="Osma" typeface="Ebrima"/>
-        <a:font script="Phag" typeface="Phagspa"/>
-        <a:font script="Syrn" typeface="Estrangelo Edessa"/>
-        <a:font script="Syrj" typeface="Estrangelo Edessa"/>
-        <a:font script="Syre" typeface="Estrangelo Edessa"/>
-        <a:font script="Sora" typeface="Nirmala UI"/>
-        <a:font script="Tale" typeface="Microsoft Tai Le"/>
-        <a:font script="Talu" typeface="Microsoft New Tai Lue"/>
-        <a:font script="Tfng" typeface="Ebrima"/>
-      </a:minorFont>
-    </a:fontScheme>
-    <a:fmtScheme name="Office">
-      <a:fillStyleLst>
-        <a:solidFill>
-          <a:schemeClr val="phClr"/>
-        </a:solidFill>
-        <a:gradFill rotWithShape="1">
-          <a:gsLst>
-            <a:gs pos="0">
-              <a:schemeClr val="phClr">
-                <a:lumMod val="110000"/>
-                <a:satMod val="105000"/>
-                <a:tint val="67000"/>
-              </a:schemeClr>
-            </a:gs>
-            <a:gs pos="50000">
-              <a:schemeClr val="phClr">
-                <a:lumMod val="105000"/>
-                <a:satMod val="103000"/>
-                <a:tint val="73000"/>
-              </a:schemeClr>
-            </a:gs>
-            <a:gs pos="100000">
-              <a:schemeClr val="phClr">
-                <a:lumMod val="105000"/>
-                <a:satMod val="109000"/>
-                <a:tint val="81000"/>
-              </a:schemeClr>
-            </a:gs>
-          </a:gsLst>
-          <a:lin ang="5400000" scaled="0"/>
-        </a:gradFill>
-        <a:gradFill rotWithShape="1">
-          <a:gsLst>
-            <a:gs pos="0">
-              <a:schemeClr val="phClr">
-                <a:satMod val="103000"/>
-                <a:lumMod val="102000"/>
-                <a:tint val="94000"/>
-              </a:schemeClr>
-            </a:gs>
-            <a:gs pos="50000">
-              <a:schemeClr val="phClr">
-                <a:satMod val="110000"/>
-                <a:lumMod val="100000"/>
-                <a:shade val="100000"/>
-              </a:schemeClr>
-            </a:gs>
-            <a:gs pos="100000">
-              <a:schemeClr val="phClr">
-                <a:lumMod val="99000"/>
-                <a:satMod val="120000"/>
-                <a:shade val="78000"/>
-              </a:schemeClr>
-            </a:gs>
-          </a:gsLst>
-          <a:lin ang="5400000" scaled="0"/>
-        </a:gradFill>
-      </a:fillStyleLst>
-      <a:lnStyleLst>
-        <a:ln w="6350" cap="flat" cmpd="sng" algn="ctr">
-          <a:solidFill>
-            <a:schemeClr val="phClr"/>
-          </a:solidFill>
-          <a:prstDash val="solid"/>
-          <a:miter lim="800000"/>
-        </a:ln>
-        <a:ln w="12700" cap="flat" cmpd="sng" algn="ctr">
-          <a:solidFill>
-            <a:schemeClr val="phClr"/>
-          </a:solidFill>
-          <a:prstDash val="solid"/>
-          <a:miter lim="800000"/>
-        </a:ln>
-        <a:ln w="19050" cap="flat" cmpd="sng" algn="ctr">
-          <a:solidFill>
-            <a:schemeClr val="phClr"/>
-          </a:solidFill>
-          <a:prstDash val="solid"/>
-          <a:miter lim="800000"/>
-        </a:ln>
-      </a:lnStyleLst>
-      <a:effectStyleLst>
-        <a:effectStyle>
-          <a:effectLst/>
-        </a:effectStyle>
-        <a:effectStyle>
-          <a:effectLst/>
-        </a:effectStyle>
-        <a:effectStyle>
-          <a:effectLst>
-            <a:outerShdw blurRad="57150" dist="19050" dir="5400000" algn="ctr" rotWithShape="0">
-              <a:srgbClr val="000000">
-                <a:alpha val="63000"/>
-              </a:srgbClr>
-            </a:outerShdw>
-          </a:effectLst>
-        </a:effectStyle>
-      </a:effectStyleLst>
-      <a:bgFillStyleLst>
-        <a:solidFill>
-          <a:schemeClr val="phClr"/>
-        </a:solidFill>
-        <a:solidFill>
-          <a:schemeClr val="phClr">
-            <a:tint val="95000"/>
-            <a:satMod val="170000"/>
-          </a:schemeClr>
-        </a:solidFill>
-        <a:gradFill rotWithShape="1">
-          <a:gsLst>
-            <a:gs pos="0">
-              <a:schemeClr val="phClr">
-                <a:tint val="93000"/>
-                <a:satMod val="150000"/>
-                <a:shade val="98000"/>
-                <a:lumMod val="102000"/>
-              </a:schemeClr>
-            </a:gs>
-            <a:gs pos="50000">
-              <a:schemeClr val="phClr">
-                <a:tint val="98000"/>
-                <a:satMod val="130000"/>
-                <a:shade val="90000"/>
-                <a:lumMod val="103000"/>
-              </a:schemeClr>
-            </a:gs>
-            <a:gs pos="100000">
-              <a:schemeClr val="phClr">
-                <a:shade val="63000"/>
-                <a:satMod val="120000"/>
-              </a:schemeClr>
-            </a:gs>
-          </a:gsLst>
-          <a:lin ang="5400000" scaled="0"/>
-        </a:gradFill>
-      </a:bgFillStyleLst>
-    </a:fmtScheme>
-  </a:themeElements>
-  <a:objectDefaults/>
-  <a:extraClrSchemeLst/>
-  <a:extLst>
-    <a:ext uri="{05A4C25C-085E-4340-85A3-A5531E510DB2}">
-      <thm15:themeFamily xmlns:thm15="http://schemas.microsoft.com/office/thememl/2012/main" name="Office Theme" id="{62F939B6-93AF-4DB8-9C6B-D6C7DFDC589F}" vid="{4A3C46E8-61CC-4603-A589-7422A47A8E4A}"/>
-    </a:ext>
-  </a:extLst>
-</a:theme>
-</file>
-
-<file path=ppt/theme/theme3.xml><?xml version="1.0" encoding="utf-8"?>
-<a:theme xmlns:a="http://schemas.openxmlformats.org/drawingml/2006/main" name="Thème Office">
-  <a:themeElements>
-    <a:clrScheme name="Office">
-      <a:dk1>
-        <a:sysClr val="windowText" lastClr="000000"/>
-      </a:dk1>
-      <a:lt1>
-        <a:sysClr val="window" lastClr="FFFFFF"/>
-      </a:lt1>
-      <a:dk2>
-        <a:srgbClr val="44546A"/>
-      </a:dk2>
-      <a:lt2>
-        <a:srgbClr val="E7E6E6"/>
-      </a:lt2>
-      <a:accent1>
-        <a:srgbClr val="4472C4"/>
-      </a:accent1>
-      <a:accent2>
-        <a:srgbClr val="ED7D31"/>
-      </a:accent2>
-      <a:accent3>
-        <a:srgbClr val="A5A5A5"/>
-      </a:accent3>
-      <a:accent4>
-        <a:srgbClr val="FFC000"/>
-      </a:accent4>
-      <a:accent5>
-        <a:srgbClr val="5B9BD5"/>
-      </a:accent5>
-      <a:accent6>
-        <a:srgbClr val="70AD47"/>
-      </a:accent6>
-      <a:hlink>
-        <a:srgbClr val="0563C1"/>
-      </a:hlink>
-      <a:folHlink>
-        <a:srgbClr val="954F72"/>
-      </a:folHlink>
-    </a:clrScheme>
-    <a:fontScheme name="Office">
-      <a:majorFont>
-        <a:latin typeface="Calibri Light" panose="020F0302020204030204"/>
-        <a:ea typeface=""/>
-        <a:cs typeface=""/>
-        <a:font script="Jpan" typeface="游ゴシック Light"/>
-        <a:font script="Hang" typeface="맑은 고딕"/>
-        <a:font script="Hans" typeface="等线 Light"/>
-        <a:font script="Hant" typeface="新細明體"/>
-        <a:font script="Arab" typeface="Times New Roman"/>
-        <a:font script="Hebr" typeface="Times New Roman"/>
-        <a:font script="Thai" typeface="Angsana New"/>
-        <a:font script="Ethi" typeface="Nyala"/>
-        <a:font script="Beng" typeface="Vrinda"/>
-        <a:font script="Gujr" typeface="Shruti"/>
-        <a:font script="Khmr" typeface="MoolBoran"/>
-        <a:font script="Knda" typeface="Tunga"/>
-        <a:font script="Guru" typeface="Raavi"/>
-        <a:font script="Cans" typeface="Euphemia"/>
-        <a:font script="Cher" typeface="Plantagenet Cherokee"/>
-        <a:font script="Yiii" typeface="Microsoft Yi Baiti"/>
-        <a:font script="Tibt" typeface="Microsoft Himalaya"/>
-        <a:font script="Thaa" typeface="MV Boli"/>
-        <a:font script="Deva" typeface="Mangal"/>
-        <a:font script="Telu" typeface="Gautami"/>
-        <a:font script="Taml" typeface="Latha"/>
-        <a:font script="Syrc" typeface="Estrangelo Edessa"/>
-        <a:font script="Orya" typeface="Kalinga"/>
-        <a:font script="Mlym" typeface="Kartika"/>
-        <a:font script="Laoo" typeface="DokChampa"/>
-        <a:font script="Sinh" typeface="Iskoola Pota"/>
-        <a:font script="Mong" typeface="Mongolian Baiti"/>
-        <a:font script="Viet" typeface="Times New Roman"/>
-        <a:font script="Uigh" typeface="Microsoft Uighur"/>
-        <a:font script="Geor" typeface="Sylfaen"/>
-        <a:font script="Armn" typeface="Arial"/>
-        <a:font script="Bugi" typeface="Leelawadee UI"/>
-        <a:font script="Bopo" typeface="Microsoft JhengHei"/>
-        <a:font script="Java" typeface="Javanese Text"/>
-        <a:font script="Lisu" typeface="Segoe UI"/>
-        <a:font script="Mymr" typeface="Myanmar Text"/>
-        <a:font script="Nkoo" typeface="Ebrima"/>
-        <a:font script="Olck" typeface="Nirmala UI"/>
-        <a:font script="Osma" typeface="Ebrima"/>
-        <a:font script="Phag" typeface="Phagspa"/>
-        <a:font script="Syrn" typeface="Estrangelo Edessa"/>
-        <a:font script="Syrj" typeface="Estrangelo Edessa"/>
-        <a:font script="Syre" typeface="Estrangelo Edessa"/>
-        <a:font script="Sora" typeface="Nirmala UI"/>
-        <a:font script="Tale" typeface="Microsoft Tai Le"/>
-        <a:font script="Talu" typeface="Microsoft New Tai Lue"/>
-        <a:font script="Tfng" typeface="Ebrima"/>
-      </a:majorFont>
-      <a:minorFont>
-        <a:latin typeface="Calibri" panose="020F0502020204030204"/>
-        <a:ea typeface=""/>
-        <a:cs typeface=""/>
-        <a:font script="Jpan" typeface="游ゴシック"/>
-        <a:font script="Hang" typeface="맑은 고딕"/>
-        <a:font script="Hans" typeface="等线"/>
-        <a:font script="Hant" typeface="新細明體"/>
-        <a:font script="Arab" typeface="Arial"/>
-        <a:font script="Hebr" typeface="Arial"/>
-        <a:font script="Thai" typeface="Cordia New"/>
-        <a:font script="Ethi" typeface="Nyala"/>
-        <a:font script="Beng" typeface="Vrinda"/>
-        <a:font script="Gujr" typeface="Shruti"/>
-        <a:font script="Khmr" typeface="DaunPenh"/>
-        <a:font script="Knda" typeface="Tunga"/>
-        <a:font script="Guru" typeface="Raavi"/>
-        <a:font script="Cans" typeface="Euphemia"/>
-        <a:font script="Cher" typeface="Plantagenet Cherokee"/>
-        <a:font script="Yiii" typeface="Microsoft Yi Baiti"/>
-        <a:font script="Tibt" typeface="Microsoft Himalaya"/>
-        <a:font script="Thaa" typeface="MV Boli"/>
-        <a:font script="Deva" typeface="Mangal"/>
-        <a:font script="Telu" typeface="Gautami"/>
-        <a:font script="Taml" typeface="Latha"/>
-        <a:font script="Syrc" typeface="Estrangelo Edessa"/>
-        <a:font script="Orya" typeface="Kalinga"/>
-        <a:font script="Mlym" typeface="Kartika"/>
-        <a:font script="Laoo" typeface="DokChampa"/>
-        <a:font script="Sinh" typeface="Iskoola Pota"/>
-        <a:font script="Mong" typeface="Mongolian Baiti"/>
-        <a:font script="Viet" typeface="Arial"/>
-        <a:font script="Uigh" typeface="Microsoft Uighur"/>
-        <a:font script="Geor" typeface="Sylfaen"/>
-        <a:font script="Armn" typeface="Arial"/>
-        <a:font script="Bugi" typeface="Leelawadee UI"/>
-        <a:font script="Bopo" typeface="Microsoft JhengHei"/>
-        <a:font script="Java" typeface="Javanese Text"/>
-        <a:font script="Lisu" typeface="Segoe UI"/>
-        <a:font script="Mymr" typeface="Myanmar Text"/>
-        <a:font script="Nkoo" typeface="Ebrima"/>
-        <a:font script="Olck" typeface="Nirmala UI"/>
-        <a:font script="Osma" typeface="Ebrima"/>
-        <a:font script="Phag" typeface="Phagspa"/>
-        <a:font script="Syrn" typeface="Estrangelo Edessa"/>
-        <a:font script="Syrj" typeface="Estrangelo Edessa"/>
-        <a:font script="Syre" typeface="Estrangelo Edessa"/>
-        <a:font script="Sora" typeface="Nirmala UI"/>
-        <a:font script="Tale" typeface="Microsoft Tai Le"/>
-        <a:font script="Talu" typeface="Microsoft New Tai Lue"/>
-        <a:font script="Tfng" typeface="Ebrima"/>
-      </a:minorFont>
-    </a:fontScheme>
-    <a:fmtScheme name="Office">
-      <a:fillStyleLst>
-        <a:solidFill>
-          <a:schemeClr val="phClr"/>
-        </a:solidFill>
-        <a:gradFill rotWithShape="1">
-          <a:gsLst>
-            <a:gs pos="0">
-              <a:schemeClr val="phClr">
-                <a:lumMod val="110000"/>
-                <a:satMod val="105000"/>
-                <a:tint val="67000"/>
-              </a:schemeClr>
-            </a:gs>
-            <a:gs pos="50000">
-              <a:schemeClr val="phClr">
-                <a:lumMod val="105000"/>
-                <a:satMod val="103000"/>
-                <a:tint val="73000"/>
-              </a:schemeClr>
-            </a:gs>
-            <a:gs pos="100000">
-              <a:schemeClr val="phClr">
-                <a:lumMod val="105000"/>
-                <a:satMod val="109000"/>
-                <a:tint val="81000"/>
-              </a:schemeClr>
-            </a:gs>
-          </a:gsLst>
-          <a:lin ang="5400000" scaled="0"/>
-        </a:gradFill>
-        <a:gradFill rotWithShape="1">
-          <a:gsLst>
-            <a:gs pos="0">
-              <a:schemeClr val="phClr">
-                <a:satMod val="103000"/>
-                <a:lumMod val="102000"/>
-                <a:tint val="94000"/>
-              </a:schemeClr>
-            </a:gs>
-            <a:gs pos="50000">
-              <a:schemeClr val="phClr">
-                <a:satMod val="110000"/>
-                <a:lumMod val="100000"/>
-                <a:shade val="100000"/>
-              </a:schemeClr>
-            </a:gs>
-            <a:gs pos="100000">
-              <a:schemeClr val="phClr">
-                <a:lumMod val="99000"/>
-                <a:satMod val="120000"/>
-                <a:shade val="78000"/>
-              </a:schemeClr>
-            </a:gs>
-          </a:gsLst>
-          <a:lin ang="5400000" scaled="0"/>
-        </a:gradFill>
-      </a:fillStyleLst>
-      <a:lnStyleLst>
-        <a:ln w="6350" cap="flat" cmpd="sng" algn="ctr">
-          <a:solidFill>
-            <a:schemeClr val="phClr"/>
-          </a:solidFill>
-          <a:prstDash val="solid"/>
-          <a:miter lim="800000"/>
-        </a:ln>
-        <a:ln w="12700" cap="flat" cmpd="sng" algn="ctr">
-          <a:solidFill>
-            <a:schemeClr val="phClr"/>
-          </a:solidFill>
-          <a:prstDash val="solid"/>
-          <a:miter lim="800000"/>
-        </a:ln>
-        <a:ln w="19050" cap="flat" cmpd="sng" algn="ctr">
-          <a:solidFill>
-            <a:schemeClr val="phClr"/>
-          </a:solidFill>
-          <a:prstDash val="solid"/>
-          <a:miter lim="800000"/>
-        </a:ln>
-      </a:lnStyleLst>
-      <a:effectStyleLst>
-        <a:effectStyle>
-          <a:effectLst/>
-        </a:effectStyle>
-        <a:effectStyle>
-          <a:effectLst/>
-        </a:effectStyle>
-        <a:effectStyle>
-          <a:effectLst>
-            <a:outerShdw blurRad="57150" dist="19050" dir="5400000" algn="ctr" rotWithShape="0">
-              <a:srgbClr val="000000">
-                <a:alpha val="63000"/>
-              </a:srgbClr>
-            </a:outerShdw>
-          </a:effectLst>
-        </a:effectStyle>
-      </a:effectStyleLst>
-      <a:bgFillStyleLst>
-        <a:solidFill>
-          <a:schemeClr val="phClr"/>
-        </a:solidFill>
-        <a:solidFill>
-          <a:schemeClr val="phClr">
-            <a:tint val="95000"/>
-            <a:satMod val="170000"/>
-          </a:schemeClr>
-        </a:solidFill>
-        <a:gradFill rotWithShape="1">
-          <a:gsLst>
-            <a:gs pos="0">
-              <a:schemeClr val="phClr">
-                <a:tint val="93000"/>
-                <a:satMod val="150000"/>
-                <a:shade val="98000"/>
-                <a:lumMod val="102000"/>
-              </a:schemeClr>
-            </a:gs>
-            <a:gs pos="50000">
-              <a:schemeClr val="phClr">
-                <a:tint val="98000"/>
-                <a:satMod val="130000"/>
-                <a:shade val="90000"/>
-                <a:lumMod val="103000"/>
-              </a:schemeClr>
-            </a:gs>
-            <a:gs pos="100000">
-              <a:schemeClr val="phClr">
-                <a:shade val="63000"/>
-                <a:satMod val="120000"/>
-              </a:schemeClr>
-            </a:gs>
-          </a:gsLst>
-          <a:lin ang="5400000" scaled="0"/>
-        </a:gradFill>
-      </a:bgFillStyleLst>
-    </a:fmtScheme>
-  </a:themeElements>
-  <a:objectDefaults/>
-  <a:extraClrSchemeLst/>
-  <a:extLst>
-    <a:ext uri="{05A4C25C-085E-4340-85A3-A5531E510DB2}">
-      <thm15:themeFamily xmlns:thm15="http://schemas.microsoft.com/office/thememl/2012/main" name="Office Theme" id="{62F939B6-93AF-4DB8-9C6B-D6C7DFDC589F}" vid="{4A3C46E8-61CC-4603-A589-7422A47A8E4A}"/>
-    </a:ext>
-  </a:extLst>
-</a:theme>
 </file>
</xml_diff>